<commit_message>
fresnel and piaa separation
</commit_message>
<xml_diff>
--- a/src/static/interface_fresnel_schematic.pptx
+++ b/src/static/interface_fresnel_schematic.pptx
@@ -104,6 +104,11 @@
       </a:defRPr>
     </a:lvl9pPr>
   </p:defaultTextStyle>
+  <p:extLst>
+    <p:ext uri="{EFAFB233-063F-42B5-8137-9DF3F51BA10A}">
+      <p15:sldGuideLst xmlns:p15="http://schemas.microsoft.com/office/powerpoint/2012/main"/>
+    </p:ext>
+  </p:extLst>
 </p:presentation>
 </file>
 
@@ -238,7 +243,7 @@
           <a:p>
             <a:fld id="{A43B8D75-EE93-4C7E-8017-0741A7D0BF47}" type="datetimeFigureOut">
               <a:rPr lang="en-US" smtClean="0"/>
-              <a:t>8/22/2024</a:t>
+              <a:t>9/17/24</a:t>
             </a:fld>
             <a:endParaRPr lang="en-US"/>
           </a:p>
@@ -408,7 +413,7 @@
           <a:p>
             <a:fld id="{A43B8D75-EE93-4C7E-8017-0741A7D0BF47}" type="datetimeFigureOut">
               <a:rPr lang="en-US" smtClean="0"/>
-              <a:t>8/22/2024</a:t>
+              <a:t>9/17/24</a:t>
             </a:fld>
             <a:endParaRPr lang="en-US"/>
           </a:p>
@@ -588,7 +593,7 @@
           <a:p>
             <a:fld id="{A43B8D75-EE93-4C7E-8017-0741A7D0BF47}" type="datetimeFigureOut">
               <a:rPr lang="en-US" smtClean="0"/>
-              <a:t>8/22/2024</a:t>
+              <a:t>9/17/24</a:t>
             </a:fld>
             <a:endParaRPr lang="en-US"/>
           </a:p>
@@ -758,7 +763,7 @@
           <a:p>
             <a:fld id="{A43B8D75-EE93-4C7E-8017-0741A7D0BF47}" type="datetimeFigureOut">
               <a:rPr lang="en-US" smtClean="0"/>
-              <a:t>8/22/2024</a:t>
+              <a:t>9/17/24</a:t>
             </a:fld>
             <a:endParaRPr lang="en-US"/>
           </a:p>
@@ -1002,7 +1007,7 @@
           <a:p>
             <a:fld id="{A43B8D75-EE93-4C7E-8017-0741A7D0BF47}" type="datetimeFigureOut">
               <a:rPr lang="en-US" smtClean="0"/>
-              <a:t>8/22/2024</a:t>
+              <a:t>9/17/24</a:t>
             </a:fld>
             <a:endParaRPr lang="en-US"/>
           </a:p>
@@ -1234,7 +1239,7 @@
           <a:p>
             <a:fld id="{A43B8D75-EE93-4C7E-8017-0741A7D0BF47}" type="datetimeFigureOut">
               <a:rPr lang="en-US" smtClean="0"/>
-              <a:t>8/22/2024</a:t>
+              <a:t>9/17/24</a:t>
             </a:fld>
             <a:endParaRPr lang="en-US"/>
           </a:p>
@@ -1601,7 +1606,7 @@
           <a:p>
             <a:fld id="{A43B8D75-EE93-4C7E-8017-0741A7D0BF47}" type="datetimeFigureOut">
               <a:rPr lang="en-US" smtClean="0"/>
-              <a:t>8/22/2024</a:t>
+              <a:t>9/17/24</a:t>
             </a:fld>
             <a:endParaRPr lang="en-US"/>
           </a:p>
@@ -1719,7 +1724,7 @@
           <a:p>
             <a:fld id="{A43B8D75-EE93-4C7E-8017-0741A7D0BF47}" type="datetimeFigureOut">
               <a:rPr lang="en-US" smtClean="0"/>
-              <a:t>8/22/2024</a:t>
+              <a:t>9/17/24</a:t>
             </a:fld>
             <a:endParaRPr lang="en-US"/>
           </a:p>
@@ -1814,7 +1819,7 @@
           <a:p>
             <a:fld id="{A43B8D75-EE93-4C7E-8017-0741A7D0BF47}" type="datetimeFigureOut">
               <a:rPr lang="en-US" smtClean="0"/>
-              <a:t>8/22/2024</a:t>
+              <a:t>9/17/24</a:t>
             </a:fld>
             <a:endParaRPr lang="en-US"/>
           </a:p>
@@ -2091,7 +2096,7 @@
           <a:p>
             <a:fld id="{A43B8D75-EE93-4C7E-8017-0741A7D0BF47}" type="datetimeFigureOut">
               <a:rPr lang="en-US" smtClean="0"/>
-              <a:t>8/22/2024</a:t>
+              <a:t>9/17/24</a:t>
             </a:fld>
             <a:endParaRPr lang="en-US"/>
           </a:p>
@@ -2348,7 +2353,7 @@
           <a:p>
             <a:fld id="{A43B8D75-EE93-4C7E-8017-0741A7D0BF47}" type="datetimeFigureOut">
               <a:rPr lang="en-US" smtClean="0"/>
-              <a:t>8/22/2024</a:t>
+              <a:t>9/17/24</a:t>
             </a:fld>
             <a:endParaRPr lang="en-US"/>
           </a:p>
@@ -2561,7 +2566,7 @@
           <a:p>
             <a:fld id="{A43B8D75-EE93-4C7E-8017-0741A7D0BF47}" type="datetimeFigureOut">
               <a:rPr lang="en-US" smtClean="0"/>
-              <a:t>8/22/2024</a:t>
+              <a:t>9/17/24</a:t>
             </a:fld>
             <a:endParaRPr lang="en-US"/>
           </a:p>
@@ -3738,8 +3743,8 @@
           </a:p>
         </p:txBody>
       </p:sp>
-      <mc:AlternateContent xmlns:mc="http://schemas.openxmlformats.org/markup-compatibility/2006">
-        <mc:Choice xmlns:a14="http://schemas.microsoft.com/office/drawing/2010/main" Requires="a14">
+      <mc:AlternateContent xmlns:mc="http://schemas.openxmlformats.org/markup-compatibility/2006" xmlns:a14="http://schemas.microsoft.com/office/drawing/2010/main">
+        <mc:Choice Requires="a14">
           <p:sp>
             <p:nvSpPr>
               <p:cNvPr id="42" name="TextBox 41">
@@ -3768,6 +3773,7 @@
               </a:bodyPr>
               <a:lstStyle/>
               <a:p>
+                <a:pPr/>
                 <a14:m>
                   <m:oMathPara xmlns:m="http://schemas.openxmlformats.org/officeDocument/2006/math">
                     <m:oMathParaPr>
@@ -3807,7 +3813,7 @@
             </p:txBody>
           </p:sp>
         </mc:Choice>
-        <mc:Fallback>
+        <mc:Fallback xmlns="">
           <p:sp>
             <p:nvSpPr>
               <p:cNvPr id="42" name="TextBox 41">
@@ -3904,8 +3910,8 @@
           </a:p>
         </p:txBody>
       </p:sp>
-      <mc:AlternateContent xmlns:mc="http://schemas.openxmlformats.org/markup-compatibility/2006">
-        <mc:Choice xmlns:a14="http://schemas.microsoft.com/office/drawing/2010/main" Requires="a14">
+      <mc:AlternateContent xmlns:mc="http://schemas.openxmlformats.org/markup-compatibility/2006" xmlns:a14="http://schemas.microsoft.com/office/drawing/2010/main">
+        <mc:Choice Requires="a14">
           <p:sp>
             <p:nvSpPr>
               <p:cNvPr id="44" name="TextBox 43">
@@ -3934,6 +3940,7 @@
               </a:bodyPr>
               <a:lstStyle/>
               <a:p>
+                <a:pPr/>
                 <a14:m>
                   <m:oMathPara xmlns:m="http://schemas.openxmlformats.org/officeDocument/2006/math">
                     <m:oMathParaPr>
@@ -3973,7 +3980,7 @@
             </p:txBody>
           </p:sp>
         </mc:Choice>
-        <mc:Fallback>
+        <mc:Fallback xmlns="">
           <p:sp>
             <p:nvSpPr>
               <p:cNvPr id="44" name="TextBox 43">
@@ -4070,8 +4077,8 @@
           </a:p>
         </p:txBody>
       </p:sp>
-      <mc:AlternateContent xmlns:mc="http://schemas.openxmlformats.org/markup-compatibility/2006">
-        <mc:Choice xmlns:a14="http://schemas.microsoft.com/office/drawing/2010/main" Requires="a14">
+      <mc:AlternateContent xmlns:mc="http://schemas.openxmlformats.org/markup-compatibility/2006" xmlns:a14="http://schemas.microsoft.com/office/drawing/2010/main">
+        <mc:Choice Requires="a14">
           <p:sp>
             <p:nvSpPr>
               <p:cNvPr id="46" name="TextBox 45">
@@ -4100,6 +4107,7 @@
               </a:bodyPr>
               <a:lstStyle/>
               <a:p>
+                <a:pPr/>
                 <a14:m>
                   <m:oMathPara xmlns:m="http://schemas.openxmlformats.org/officeDocument/2006/math">
                     <m:oMathParaPr>
@@ -4139,7 +4147,7 @@
             </p:txBody>
           </p:sp>
         </mc:Choice>
-        <mc:Fallback>
+        <mc:Fallback xmlns="">
           <p:sp>
             <p:nvSpPr>
               <p:cNvPr id="46" name="TextBox 45">
@@ -4184,8 +4192,8 @@
           </p:sp>
         </mc:Fallback>
       </mc:AlternateContent>
-      <mc:AlternateContent xmlns:mc="http://schemas.openxmlformats.org/markup-compatibility/2006">
-        <mc:Choice xmlns:a14="http://schemas.microsoft.com/office/drawing/2010/main" Requires="a14">
+      <mc:AlternateContent xmlns:mc="http://schemas.openxmlformats.org/markup-compatibility/2006" xmlns:a14="http://schemas.microsoft.com/office/drawing/2010/main">
+        <mc:Choice Requires="a14">
           <p:sp>
             <p:nvSpPr>
               <p:cNvPr id="47" name="TextBox 46">
@@ -4214,6 +4222,7 @@
               </a:bodyPr>
               <a:lstStyle/>
               <a:p>
+                <a:pPr/>
                 <a14:m>
                   <m:oMathPara xmlns:m="http://schemas.openxmlformats.org/officeDocument/2006/math">
                     <m:oMathParaPr>
@@ -4253,7 +4262,7 @@
             </p:txBody>
           </p:sp>
         </mc:Choice>
-        <mc:Fallback>
+        <mc:Fallback xmlns="">
           <p:sp>
             <p:nvSpPr>
               <p:cNvPr id="47" name="TextBox 46">
@@ -4298,8 +4307,8 @@
           </p:sp>
         </mc:Fallback>
       </mc:AlternateContent>
-      <mc:AlternateContent xmlns:mc="http://schemas.openxmlformats.org/markup-compatibility/2006">
-        <mc:Choice xmlns:a14="http://schemas.microsoft.com/office/drawing/2010/main" Requires="a14">
+      <mc:AlternateContent xmlns:mc="http://schemas.openxmlformats.org/markup-compatibility/2006" xmlns:a14="http://schemas.microsoft.com/office/drawing/2010/main">
+        <mc:Choice Requires="a14">
           <p:sp>
             <p:nvSpPr>
               <p:cNvPr id="48" name="TextBox 47">
@@ -4328,6 +4337,7 @@
               </a:bodyPr>
               <a:lstStyle/>
               <a:p>
+                <a:pPr/>
                 <a14:m>
                   <m:oMathPara xmlns:m="http://schemas.openxmlformats.org/officeDocument/2006/math">
                     <m:oMathParaPr>
@@ -4367,7 +4377,7 @@
             </p:txBody>
           </p:sp>
         </mc:Choice>
-        <mc:Fallback>
+        <mc:Fallback xmlns="">
           <p:sp>
             <p:nvSpPr>
               <p:cNvPr id="48" name="TextBox 47">
@@ -4442,7 +4452,7 @@
           <a:p>
             <a:r>
               <a:rPr lang="en-US" sz="1201" dirty="0"/>
-              <a:t>Incidence ray</a:t>
+              <a:t>Incident ray</a:t>
             </a:r>
           </a:p>
         </p:txBody>

</xml_diff>